<commit_message>
ajuste de imagen en presentacion
</commit_message>
<xml_diff>
--- a/Project/Views/TrainECG.views.pptx
+++ b/Project/Views/TrainECG.views.pptx
@@ -5681,6 +5681,42 @@
           <a:xfrm>
             <a:off x="1143000" y="90939"/>
             <a:ext cx="7705995" cy="7086600"/>
+          </a:xfrm>
+          <a:prstGeom prst="rect">
+            <a:avLst/>
+          </a:prstGeom>
+        </p:spPr>
+      </p:pic>
+      <p:pic>
+        <p:nvPicPr>
+          <p:cNvPr id="6" name="Imagen 5">
+            <a:extLst>
+              <a:ext uri="{FF2B5EF4-FFF2-40B4-BE49-F238E27FC236}">
+                <a16:creationId xmlns:a16="http://schemas.microsoft.com/office/drawing/2014/main" id="{C7C3AA91-34EC-06CD-065C-978743EEC338}"/>
+              </a:ext>
+            </a:extLst>
+          </p:cNvPr>
+          <p:cNvPicPr>
+            <a:picLocks noChangeAspect="1"/>
+          </p:cNvPicPr>
+          <p:nvPr/>
+        </p:nvPicPr>
+        <p:blipFill>
+          <a:blip r:embed="rId6">
+            <a:extLst>
+              <a:ext uri="{28A0092B-C50C-407E-A947-70E740481C1C}">
+                <a14:useLocalDpi xmlns:a14="http://schemas.microsoft.com/office/drawing/2010/main" val="0"/>
+              </a:ext>
+            </a:extLst>
+          </a:blip>
+          <a:stretch>
+            <a:fillRect/>
+          </a:stretch>
+        </p:blipFill>
+        <p:spPr>
+          <a:xfrm>
+            <a:off x="1219200" y="1981200"/>
+            <a:ext cx="7543800" cy="5105400"/>
           </a:xfrm>
           <a:prstGeom prst="rect">
             <a:avLst/>

</xml_diff>